<commit_message>
5 feature set exp added
</commit_message>
<xml_diff>
--- a/Diabetes/Traditional vs 11 features for prof/results.pptx
+++ b/Diabetes/Traditional vs 11 features for prof/results.pptx
@@ -111,6 +111,11 @@
       </a:defRPr>
     </a:lvl9pPr>
   </p:defaultTextStyle>
+  <p:extLst>
+    <p:ext uri="{EFAFB233-063F-42B5-8137-9DF3F51BA10A}">
+      <p15:sldGuideLst xmlns:p15="http://schemas.microsoft.com/office/powerpoint/2012/main"/>
+    </p:ext>
+  </p:extLst>
 </p:presentation>
 </file>
 
@@ -261,7 +266,7 @@
           <a:p>
             <a:fld id="{5A1BE38C-0066-4514-8F57-9DEBB6024065}" type="datetimeFigureOut">
               <a:rPr lang="en-US" smtClean="0"/>
-              <a:t>12/30/2019</a:t>
+              <a:t>1/1/2020</a:t>
             </a:fld>
             <a:endParaRPr lang="en-US"/>
           </a:p>
@@ -459,7 +464,7 @@
           <a:p>
             <a:fld id="{5A1BE38C-0066-4514-8F57-9DEBB6024065}" type="datetimeFigureOut">
               <a:rPr lang="en-US" smtClean="0"/>
-              <a:t>12/30/2019</a:t>
+              <a:t>1/1/2020</a:t>
             </a:fld>
             <a:endParaRPr lang="en-US"/>
           </a:p>
@@ -667,7 +672,7 @@
           <a:p>
             <a:fld id="{5A1BE38C-0066-4514-8F57-9DEBB6024065}" type="datetimeFigureOut">
               <a:rPr lang="en-US" smtClean="0"/>
-              <a:t>12/30/2019</a:t>
+              <a:t>1/1/2020</a:t>
             </a:fld>
             <a:endParaRPr lang="en-US"/>
           </a:p>
@@ -865,7 +870,7 @@
           <a:p>
             <a:fld id="{5A1BE38C-0066-4514-8F57-9DEBB6024065}" type="datetimeFigureOut">
               <a:rPr lang="en-US" smtClean="0"/>
-              <a:t>12/30/2019</a:t>
+              <a:t>1/1/2020</a:t>
             </a:fld>
             <a:endParaRPr lang="en-US"/>
           </a:p>
@@ -1140,7 +1145,7 @@
           <a:p>
             <a:fld id="{5A1BE38C-0066-4514-8F57-9DEBB6024065}" type="datetimeFigureOut">
               <a:rPr lang="en-US" smtClean="0"/>
-              <a:t>12/30/2019</a:t>
+              <a:t>1/1/2020</a:t>
             </a:fld>
             <a:endParaRPr lang="en-US"/>
           </a:p>
@@ -1405,7 +1410,7 @@
           <a:p>
             <a:fld id="{5A1BE38C-0066-4514-8F57-9DEBB6024065}" type="datetimeFigureOut">
               <a:rPr lang="en-US" smtClean="0"/>
-              <a:t>12/30/2019</a:t>
+              <a:t>1/1/2020</a:t>
             </a:fld>
             <a:endParaRPr lang="en-US"/>
           </a:p>
@@ -1817,7 +1822,7 @@
           <a:p>
             <a:fld id="{5A1BE38C-0066-4514-8F57-9DEBB6024065}" type="datetimeFigureOut">
               <a:rPr lang="en-US" smtClean="0"/>
-              <a:t>12/30/2019</a:t>
+              <a:t>1/1/2020</a:t>
             </a:fld>
             <a:endParaRPr lang="en-US"/>
           </a:p>
@@ -1958,7 +1963,7 @@
           <a:p>
             <a:fld id="{5A1BE38C-0066-4514-8F57-9DEBB6024065}" type="datetimeFigureOut">
               <a:rPr lang="en-US" smtClean="0"/>
-              <a:t>12/30/2019</a:t>
+              <a:t>1/1/2020</a:t>
             </a:fld>
             <a:endParaRPr lang="en-US"/>
           </a:p>
@@ -2071,7 +2076,7 @@
           <a:p>
             <a:fld id="{5A1BE38C-0066-4514-8F57-9DEBB6024065}" type="datetimeFigureOut">
               <a:rPr lang="en-US" smtClean="0"/>
-              <a:t>12/30/2019</a:t>
+              <a:t>1/1/2020</a:t>
             </a:fld>
             <a:endParaRPr lang="en-US"/>
           </a:p>
@@ -2382,7 +2387,7 @@
           <a:p>
             <a:fld id="{5A1BE38C-0066-4514-8F57-9DEBB6024065}" type="datetimeFigureOut">
               <a:rPr lang="en-US" smtClean="0"/>
-              <a:t>12/30/2019</a:t>
+              <a:t>1/1/2020</a:t>
             </a:fld>
             <a:endParaRPr lang="en-US"/>
           </a:p>
@@ -2670,7 +2675,7 @@
           <a:p>
             <a:fld id="{5A1BE38C-0066-4514-8F57-9DEBB6024065}" type="datetimeFigureOut">
               <a:rPr lang="en-US" smtClean="0"/>
-              <a:t>12/30/2019</a:t>
+              <a:t>1/1/2020</a:t>
             </a:fld>
             <a:endParaRPr lang="en-US"/>
           </a:p>
@@ -2911,7 +2916,7 @@
           <a:p>
             <a:fld id="{5A1BE38C-0066-4514-8F57-9DEBB6024065}" type="datetimeFigureOut">
               <a:rPr lang="en-US" smtClean="0"/>
-              <a:t>12/30/2019</a:t>
+              <a:t>1/1/2020</a:t>
             </a:fld>
             <a:endParaRPr lang="en-US"/>
           </a:p>
@@ -3346,9 +3351,19 @@
         </p:nvSpPr>
         <p:spPr/>
         <p:txBody>
-          <a:bodyPr/>
+          <a:bodyPr>
+            <a:normAutofit fontScale="90000"/>
+          </a:bodyPr>
           <a:lstStyle/>
           <a:p>
+            <a:r>
+              <a:rPr lang="en-US">
+                <a:solidFill>
+                  <a:srgbClr val="015756"/>
+                </a:solidFill>
+              </a:rPr>
+              <a:t>Predicting the Occurrence of Diabetes Mellitus in the next year</a:t>
+            </a:r>
             <a:endParaRPr lang="en-US"/>
           </a:p>
         </p:txBody>

</xml_diff>